<commit_message>
put together a better graph/explanation for BBR
</commit_message>
<xml_diff>
--- a/PacketGuidedOptimization_Sharkfest2024_EU_JClark.pptx
+++ b/PacketGuidedOptimization_Sharkfest2024_EU_JClark.pptx
@@ -299,7 +299,7 @@
   <pc:docChgLst>
     <pc:chgData name="Josh Clark" userId="038a1c1f14b3b0b8" providerId="LiveId" clId="{F8908E4E-5DCD-EC49-8621-19D828DF10B4}"/>
     <pc:docChg chg="undo custSel addSld delSld modSld sldOrd">
-      <pc:chgData name="Josh Clark" userId="038a1c1f14b3b0b8" providerId="LiveId" clId="{F8908E4E-5DCD-EC49-8621-19D828DF10B4}" dt="2024-10-25T20:30:56.230" v="1280" actId="20577"/>
+      <pc:chgData name="Josh Clark" userId="038a1c1f14b3b0b8" providerId="LiveId" clId="{F8908E4E-5DCD-EC49-8621-19D828DF10B4}" dt="2024-10-27T16:34:40.972" v="1440" actId="1076"/>
       <pc:docMkLst>
         <pc:docMk/>
       </pc:docMkLst>
@@ -691,7 +691,7 @@
         </pc:spChg>
       </pc:sldChg>
       <pc:sldChg chg="addSp delSp modSp add mod ord">
-        <pc:chgData name="Josh Clark" userId="038a1c1f14b3b0b8" providerId="LiveId" clId="{F8908E4E-5DCD-EC49-8621-19D828DF10B4}" dt="2024-10-12T16:30:22.911" v="805" actId="20577"/>
+        <pc:chgData name="Josh Clark" userId="038a1c1f14b3b0b8" providerId="LiveId" clId="{F8908E4E-5DCD-EC49-8621-19D828DF10B4}" dt="2024-10-27T16:34:40.972" v="1440" actId="1076"/>
         <pc:sldMkLst>
           <pc:docMk/>
           <pc:sldMk cId="3245392046" sldId="273"/>
@@ -705,7 +705,7 @@
           </ac:spMkLst>
         </pc:spChg>
         <pc:spChg chg="mod">
-          <ac:chgData name="Josh Clark" userId="038a1c1f14b3b0b8" providerId="LiveId" clId="{F8908E4E-5DCD-EC49-8621-19D828DF10B4}" dt="2024-10-12T16:30:22.911" v="805" actId="20577"/>
+          <ac:chgData name="Josh Clark" userId="038a1c1f14b3b0b8" providerId="LiveId" clId="{F8908E4E-5DCD-EC49-8621-19D828DF10B4}" dt="2024-10-27T16:34:40.972" v="1440" actId="1076"/>
           <ac:spMkLst>
             <pc:docMk/>
             <pc:sldMk cId="3245392046" sldId="273"/>
@@ -713,7 +713,7 @@
           </ac:spMkLst>
         </pc:spChg>
         <pc:spChg chg="mod">
-          <ac:chgData name="Josh Clark" userId="038a1c1f14b3b0b8" providerId="LiveId" clId="{F8908E4E-5DCD-EC49-8621-19D828DF10B4}" dt="2024-10-12T16:29:35.668" v="696" actId="1076"/>
+          <ac:chgData name="Josh Clark" userId="038a1c1f14b3b0b8" providerId="LiveId" clId="{F8908E4E-5DCD-EC49-8621-19D828DF10B4}" dt="2024-10-27T16:32:51.559" v="1312" actId="1037"/>
           <ac:spMkLst>
             <pc:docMk/>
             <pc:sldMk cId="3245392046" sldId="273"/>
@@ -729,7 +729,7 @@
           </ac:picMkLst>
         </pc:picChg>
         <pc:picChg chg="add mod">
-          <ac:chgData name="Josh Clark" userId="038a1c1f14b3b0b8" providerId="LiveId" clId="{F8908E4E-5DCD-EC49-8621-19D828DF10B4}" dt="2024-10-12T16:29:37.124" v="697" actId="1076"/>
+          <ac:chgData name="Josh Clark" userId="038a1c1f14b3b0b8" providerId="LiveId" clId="{F8908E4E-5DCD-EC49-8621-19D828DF10B4}" dt="2024-10-27T16:32:45.435" v="1304" actId="1076"/>
           <ac:picMkLst>
             <pc:docMk/>
             <pc:sldMk cId="3245392046" sldId="273"/>
@@ -10736,7 +10736,7 @@
         </p:nvSpPr>
         <p:spPr>
           <a:xfrm>
-            <a:off x="838200" y="2057400"/>
+            <a:off x="589547" y="1524000"/>
             <a:ext cx="5486400" cy="4119563"/>
           </a:xfrm>
         </p:spPr>
@@ -10746,13 +10746,28 @@
           <a:p>
             <a:r>
               <a:rPr lang="en-US" dirty="0"/>
-              <a:t>Detects BDP</a:t>
+              <a:t>Estimates BDP using RTT variance</a:t>
             </a:r>
           </a:p>
           <a:p>
             <a:r>
               <a:rPr lang="en-US" dirty="0"/>
-              <a:t>Attempts to send data at BDP rate</a:t>
+              <a:t>Sends data at BDP rate</a:t>
+            </a:r>
+          </a:p>
+          <a:p>
+            <a:pPr lvl="1"/>
+            <a:r>
+              <a:rPr lang="en-US" dirty="0"/>
+              <a:t>Periodically attempts a </a:t>
+            </a:r>
+            <a:r>
+              <a:rPr lang="en-US" dirty="0" err="1"/>
+              <a:t>pacing_gain</a:t>
+            </a:r>
+            <a:r>
+              <a:rPr lang="en-US" dirty="0"/>
+              <a:t> to see if bottleneck bandwidth has changed</a:t>
             </a:r>
           </a:p>
           <a:p>
@@ -10777,7 +10792,7 @@
         </p:nvSpPr>
         <p:spPr>
           <a:xfrm>
-            <a:off x="7630129" y="4901242"/>
+            <a:off x="7620000" y="5867400"/>
             <a:ext cx="2971800" cy="261610"/>
           </a:xfrm>
           <a:prstGeom prst="rect">
@@ -10830,14 +10845,13 @@
         </p:nvPicPr>
         <p:blipFill>
           <a:blip r:embed="rId2"/>
-          <a:stretch>
-            <a:fillRect/>
-          </a:stretch>
+          <a:srcRect/>
+          <a:stretch/>
         </p:blipFill>
         <p:spPr>
           <a:xfrm>
-            <a:off x="7010399" y="1472242"/>
-            <a:ext cx="4211259" cy="3429000"/>
+            <a:off x="5970324" y="762000"/>
+            <a:ext cx="5603311" cy="5110163"/>
           </a:xfrm>
           <a:prstGeom prst="rect">
             <a:avLst/>

</xml_diff>

<commit_message>
updated bbr explanation, removed tcp reno, and swapped in better initcwnd capture
</commit_message>
<xml_diff>
--- a/PacketGuidedOptimization_Sharkfest2024_EU_JClark.pptx
+++ b/PacketGuidedOptimization_Sharkfest2024_EU_JClark.pptx
@@ -5,7 +5,7 @@
     <p:sldMasterId id="2147483655" r:id="rId1"/>
   </p:sldMasterIdLst>
   <p:notesMasterIdLst>
-    <p:notesMasterId r:id="rId34"/>
+    <p:notesMasterId r:id="rId33"/>
   </p:notesMasterIdLst>
   <p:sldIdLst>
     <p:sldId id="256" r:id="rId2"/>
@@ -21,30 +21,29 @@
     <p:sldId id="268" r:id="rId12"/>
     <p:sldId id="269" r:id="rId13"/>
     <p:sldId id="270" r:id="rId14"/>
-    <p:sldId id="271" r:id="rId15"/>
-    <p:sldId id="272" r:id="rId16"/>
-    <p:sldId id="273" r:id="rId17"/>
-    <p:sldId id="274" r:id="rId18"/>
-    <p:sldId id="275" r:id="rId19"/>
-    <p:sldId id="276" r:id="rId20"/>
-    <p:sldId id="277" r:id="rId21"/>
-    <p:sldId id="278" r:id="rId22"/>
-    <p:sldId id="279" r:id="rId23"/>
-    <p:sldId id="280" r:id="rId24"/>
-    <p:sldId id="281" r:id="rId25"/>
-    <p:sldId id="282" r:id="rId26"/>
-    <p:sldId id="283" r:id="rId27"/>
-    <p:sldId id="284" r:id="rId28"/>
-    <p:sldId id="285" r:id="rId29"/>
-    <p:sldId id="286" r:id="rId30"/>
-    <p:sldId id="287" r:id="rId31"/>
-    <p:sldId id="288" r:id="rId32"/>
-    <p:sldId id="259" r:id="rId33"/>
+    <p:sldId id="289" r:id="rId15"/>
+    <p:sldId id="273" r:id="rId16"/>
+    <p:sldId id="274" r:id="rId17"/>
+    <p:sldId id="275" r:id="rId18"/>
+    <p:sldId id="276" r:id="rId19"/>
+    <p:sldId id="277" r:id="rId20"/>
+    <p:sldId id="278" r:id="rId21"/>
+    <p:sldId id="279" r:id="rId22"/>
+    <p:sldId id="280" r:id="rId23"/>
+    <p:sldId id="281" r:id="rId24"/>
+    <p:sldId id="282" r:id="rId25"/>
+    <p:sldId id="283" r:id="rId26"/>
+    <p:sldId id="284" r:id="rId27"/>
+    <p:sldId id="285" r:id="rId28"/>
+    <p:sldId id="286" r:id="rId29"/>
+    <p:sldId id="287" r:id="rId30"/>
+    <p:sldId id="288" r:id="rId31"/>
+    <p:sldId id="259" r:id="rId32"/>
   </p:sldIdLst>
   <p:sldSz cx="12192000" cy="6858000"/>
   <p:notesSz cx="6858000" cy="9144000"/>
   <p:custDataLst>
-    <p:tags r:id="rId35"/>
+    <p:tags r:id="rId34"/>
   </p:custDataLst>
   <p:defaultTextStyle>
     <a:defPPr marR="0" lvl="0" algn="l" rtl="0">
@@ -299,7 +298,7 @@
   <pc:docChgLst>
     <pc:chgData name="Josh Clark" userId="038a1c1f14b3b0b8" providerId="LiveId" clId="{F8908E4E-5DCD-EC49-8621-19D828DF10B4}"/>
     <pc:docChg chg="undo custSel addSld delSld modSld sldOrd">
-      <pc:chgData name="Josh Clark" userId="038a1c1f14b3b0b8" providerId="LiveId" clId="{F8908E4E-5DCD-EC49-8621-19D828DF10B4}" dt="2024-10-27T16:34:40.972" v="1440" actId="1076"/>
+      <pc:chgData name="Josh Clark" userId="038a1c1f14b3b0b8" providerId="LiveId" clId="{F8908E4E-5DCD-EC49-8621-19D828DF10B4}" dt="2024-10-29T03:15:41.938" v="1751" actId="20577"/>
       <pc:docMkLst>
         <pc:docMk/>
       </pc:docMkLst>
@@ -644,8 +643,8 @@
           </ac:picMkLst>
         </pc:picChg>
       </pc:sldChg>
-      <pc:sldChg chg="modSp new mod">
-        <pc:chgData name="Josh Clark" userId="038a1c1f14b3b0b8" providerId="LiveId" clId="{F8908E4E-5DCD-EC49-8621-19D828DF10B4}" dt="2024-10-12T16:22:54.816" v="671" actId="14100"/>
+      <pc:sldChg chg="modSp new del mod">
+        <pc:chgData name="Josh Clark" userId="038a1c1f14b3b0b8" providerId="LiveId" clId="{F8908E4E-5DCD-EC49-8621-19D828DF10B4}" dt="2024-10-29T03:11:04.083" v="1716" actId="2696"/>
         <pc:sldMkLst>
           <pc:docMk/>
           <pc:sldMk cId="3086890696" sldId="271"/>
@@ -667,8 +666,8 @@
           </ac:spMkLst>
         </pc:spChg>
       </pc:sldChg>
-      <pc:sldChg chg="modSp add mod ord">
-        <pc:chgData name="Josh Clark" userId="038a1c1f14b3b0b8" providerId="LiveId" clId="{F8908E4E-5DCD-EC49-8621-19D828DF10B4}" dt="2024-10-12T16:23:19.453" v="682" actId="20577"/>
+      <pc:sldChg chg="modSp add del mod ord">
+        <pc:chgData name="Josh Clark" userId="038a1c1f14b3b0b8" providerId="LiveId" clId="{F8908E4E-5DCD-EC49-8621-19D828DF10B4}" dt="2024-10-29T03:10:56.416" v="1713" actId="2696"/>
         <pc:sldMkLst>
           <pc:docMk/>
           <pc:sldMk cId="2560564190" sldId="272"/>
@@ -738,7 +737,7 @@
         </pc:picChg>
       </pc:sldChg>
       <pc:sldChg chg="modSp add mod ord">
-        <pc:chgData name="Josh Clark" userId="038a1c1f14b3b0b8" providerId="LiveId" clId="{F8908E4E-5DCD-EC49-8621-19D828DF10B4}" dt="2024-10-12T16:31:28.752" v="814" actId="20577"/>
+        <pc:chgData name="Josh Clark" userId="038a1c1f14b3b0b8" providerId="LiveId" clId="{F8908E4E-5DCD-EC49-8621-19D828DF10B4}" dt="2024-10-29T03:11:13.720" v="1722" actId="20577"/>
         <pc:sldMkLst>
           <pc:docMk/>
           <pc:sldMk cId="3694424356" sldId="274"/>
@@ -752,7 +751,7 @@
           </ac:spMkLst>
         </pc:spChg>
         <pc:spChg chg="mod">
-          <ac:chgData name="Josh Clark" userId="038a1c1f14b3b0b8" providerId="LiveId" clId="{F8908E4E-5DCD-EC49-8621-19D828DF10B4}" dt="2024-10-12T16:31:28.752" v="814" actId="20577"/>
+          <ac:chgData name="Josh Clark" userId="038a1c1f14b3b0b8" providerId="LiveId" clId="{F8908E4E-5DCD-EC49-8621-19D828DF10B4}" dt="2024-10-29T03:11:13.720" v="1722" actId="20577"/>
           <ac:spMkLst>
             <pc:docMk/>
             <pc:sldMk cId="3694424356" sldId="274"/>
@@ -761,7 +760,7 @@
         </pc:spChg>
       </pc:sldChg>
       <pc:sldChg chg="modSp add mod">
-        <pc:chgData name="Josh Clark" userId="038a1c1f14b3b0b8" providerId="LiveId" clId="{F8908E4E-5DCD-EC49-8621-19D828DF10B4}" dt="2024-10-12T16:31:49.148" v="826" actId="20577"/>
+        <pc:chgData name="Josh Clark" userId="038a1c1f14b3b0b8" providerId="LiveId" clId="{F8908E4E-5DCD-EC49-8621-19D828DF10B4}" dt="2024-10-29T03:11:17.248" v="1724" actId="20577"/>
         <pc:sldMkLst>
           <pc:docMk/>
           <pc:sldMk cId="2087821736" sldId="275"/>
@@ -775,7 +774,7 @@
           </ac:spMkLst>
         </pc:spChg>
         <pc:spChg chg="mod">
-          <ac:chgData name="Josh Clark" userId="038a1c1f14b3b0b8" providerId="LiveId" clId="{F8908E4E-5DCD-EC49-8621-19D828DF10B4}" dt="2024-10-12T16:31:49.148" v="826" actId="20577"/>
+          <ac:chgData name="Josh Clark" userId="038a1c1f14b3b0b8" providerId="LiveId" clId="{F8908E4E-5DCD-EC49-8621-19D828DF10B4}" dt="2024-10-29T03:11:17.248" v="1724" actId="20577"/>
           <ac:spMkLst>
             <pc:docMk/>
             <pc:sldMk cId="2087821736" sldId="275"/>
@@ -931,7 +930,7 @@
         </pc:picChg>
       </pc:sldChg>
       <pc:sldChg chg="modSp add mod ord">
-        <pc:chgData name="Josh Clark" userId="038a1c1f14b3b0b8" providerId="LiveId" clId="{F8908E4E-5DCD-EC49-8621-19D828DF10B4}" dt="2024-10-12T16:38:03.600" v="947" actId="20577"/>
+        <pc:chgData name="Josh Clark" userId="038a1c1f14b3b0b8" providerId="LiveId" clId="{F8908E4E-5DCD-EC49-8621-19D828DF10B4}" dt="2024-10-29T03:11:22.605" v="1730" actId="20577"/>
         <pc:sldMkLst>
           <pc:docMk/>
           <pc:sldMk cId="1179000826" sldId="280"/>
@@ -945,7 +944,7 @@
           </ac:spMkLst>
         </pc:spChg>
         <pc:spChg chg="mod">
-          <ac:chgData name="Josh Clark" userId="038a1c1f14b3b0b8" providerId="LiveId" clId="{F8908E4E-5DCD-EC49-8621-19D828DF10B4}" dt="2024-10-12T16:38:03.600" v="947" actId="20577"/>
+          <ac:chgData name="Josh Clark" userId="038a1c1f14b3b0b8" providerId="LiveId" clId="{F8908E4E-5DCD-EC49-8621-19D828DF10B4}" dt="2024-10-29T03:11:22.605" v="1730" actId="20577"/>
           <ac:spMkLst>
             <pc:docMk/>
             <pc:sldMk cId="1179000826" sldId="280"/>
@@ -993,7 +992,7 @@
         </pc:picChg>
       </pc:sldChg>
       <pc:sldChg chg="modSp add mod ord">
-        <pc:chgData name="Josh Clark" userId="038a1c1f14b3b0b8" providerId="LiveId" clId="{F8908E4E-5DCD-EC49-8621-19D828DF10B4}" dt="2024-10-12T16:39:19.771" v="993" actId="20577"/>
+        <pc:chgData name="Josh Clark" userId="038a1c1f14b3b0b8" providerId="LiveId" clId="{F8908E4E-5DCD-EC49-8621-19D828DF10B4}" dt="2024-10-29T03:11:27.185" v="1732" actId="20577"/>
         <pc:sldMkLst>
           <pc:docMk/>
           <pc:sldMk cId="3577459511" sldId="282"/>
@@ -1007,7 +1006,7 @@
           </ac:spMkLst>
         </pc:spChg>
         <pc:spChg chg="mod">
-          <ac:chgData name="Josh Clark" userId="038a1c1f14b3b0b8" providerId="LiveId" clId="{F8908E4E-5DCD-EC49-8621-19D828DF10B4}" dt="2024-10-12T16:39:19.771" v="993" actId="20577"/>
+          <ac:chgData name="Josh Clark" userId="038a1c1f14b3b0b8" providerId="LiveId" clId="{F8908E4E-5DCD-EC49-8621-19D828DF10B4}" dt="2024-10-29T03:11:27.185" v="1732" actId="20577"/>
           <ac:spMkLst>
             <pc:docMk/>
             <pc:sldMk cId="3577459511" sldId="282"/>
@@ -1134,7 +1133,7 @@
         </pc:picChg>
       </pc:sldChg>
       <pc:sldChg chg="modSp add mod ord">
-        <pc:chgData name="Josh Clark" userId="038a1c1f14b3b0b8" providerId="LiveId" clId="{F8908E4E-5DCD-EC49-8621-19D828DF10B4}" dt="2024-10-12T16:41:37.281" v="1139" actId="20577"/>
+        <pc:chgData name="Josh Clark" userId="038a1c1f14b3b0b8" providerId="LiveId" clId="{F8908E4E-5DCD-EC49-8621-19D828DF10B4}" dt="2024-10-29T03:15:41.938" v="1751" actId="20577"/>
         <pc:sldMkLst>
           <pc:docMk/>
           <pc:sldMk cId="1045957284" sldId="285"/>
@@ -1148,7 +1147,7 @@
           </ac:spMkLst>
         </pc:spChg>
         <pc:spChg chg="mod">
-          <ac:chgData name="Josh Clark" userId="038a1c1f14b3b0b8" providerId="LiveId" clId="{F8908E4E-5DCD-EC49-8621-19D828DF10B4}" dt="2024-10-12T16:41:37.281" v="1139" actId="20577"/>
+          <ac:chgData name="Josh Clark" userId="038a1c1f14b3b0b8" providerId="LiveId" clId="{F8908E4E-5DCD-EC49-8621-19D828DF10B4}" dt="2024-10-29T03:15:41.938" v="1751" actId="20577"/>
           <ac:spMkLst>
             <pc:docMk/>
             <pc:sldMk cId="1045957284" sldId="285"/>
@@ -1200,6 +1199,36 @@
             <ac:spMk id="2" creationId="{CB9F141E-2BD8-F5FD-A41D-FAC2B3047E5E}"/>
           </ac:spMkLst>
         </pc:spChg>
+      </pc:sldChg>
+      <pc:sldChg chg="modSp add mod ord">
+        <pc:chgData name="Josh Clark" userId="038a1c1f14b3b0b8" providerId="LiveId" clId="{F8908E4E-5DCD-EC49-8621-19D828DF10B4}" dt="2024-10-29T03:05:41.908" v="1712" actId="20577"/>
+        <pc:sldMkLst>
+          <pc:docMk/>
+          <pc:sldMk cId="3571039076" sldId="289"/>
+        </pc:sldMkLst>
+        <pc:spChg chg="mod">
+          <ac:chgData name="Josh Clark" userId="038a1c1f14b3b0b8" providerId="LiveId" clId="{F8908E4E-5DCD-EC49-8621-19D828DF10B4}" dt="2024-10-29T03:05:41.908" v="1712" actId="20577"/>
+          <ac:spMkLst>
+            <pc:docMk/>
+            <pc:sldMk cId="3571039076" sldId="289"/>
+            <ac:spMk id="3" creationId="{5A6B7AE0-C2D8-C909-ADEC-BB90CF270043}"/>
+          </ac:spMkLst>
+        </pc:spChg>
+        <pc:picChg chg="mod">
+          <ac:chgData name="Josh Clark" userId="038a1c1f14b3b0b8" providerId="LiveId" clId="{F8908E4E-5DCD-EC49-8621-19D828DF10B4}" dt="2024-10-29T03:04:01.338" v="1442" actId="14826"/>
+          <ac:picMkLst>
+            <pc:docMk/>
+            <pc:sldMk cId="3571039076" sldId="289"/>
+            <ac:picMk id="6" creationId="{9466D94C-3207-5242-C789-A00503B939B4}"/>
+          </ac:picMkLst>
+        </pc:picChg>
+      </pc:sldChg>
+      <pc:sldChg chg="add del">
+        <pc:chgData name="Josh Clark" userId="038a1c1f14b3b0b8" providerId="LiveId" clId="{F8908E4E-5DCD-EC49-8621-19D828DF10B4}" dt="2024-10-29T03:11:01.946" v="1715" actId="2696"/>
+        <pc:sldMkLst>
+          <pc:docMk/>
+          <pc:sldMk cId="2797152890" sldId="290"/>
+        </pc:sldMkLst>
       </pc:sldChg>
     </pc:docChg>
   </pc:docChgLst>
@@ -2789,7 +2818,7 @@
             </a:pPr>
             <a:fld id="{00000000-1234-1234-1234-123412341234}" type="slidenum">
               <a:rPr lang="de-DE"/>
-              <a:t>32</a:t>
+              <a:t>31</a:t>
             </a:fld>
             <a:endParaRPr/>
           </a:p>
@@ -10465,116 +10494,10 @@
   <p:cSld>
     <p:spTree>
       <p:nvGrpSpPr>
-        <p:cNvPr id="1" name=""/>
-        <p:cNvGrpSpPr/>
-        <p:nvPr/>
-      </p:nvGrpSpPr>
-      <p:grpSpPr>
-        <a:xfrm>
-          <a:off x="0" y="0"/>
-          <a:ext cx="0" cy="0"/>
-          <a:chOff x="0" y="0"/>
-          <a:chExt cx="0" cy="0"/>
-        </a:xfrm>
-      </p:grpSpPr>
-      <p:sp>
-        <p:nvSpPr>
-          <p:cNvPr id="2" name="Title 1">
-            <a:extLst>
-              <a:ext uri="{FF2B5EF4-FFF2-40B4-BE49-F238E27FC236}">
-                <a16:creationId xmlns:a16="http://schemas.microsoft.com/office/drawing/2014/main" id="{0758F210-A11E-8D73-80BB-02A739F7F151}"/>
-              </a:ext>
-            </a:extLst>
-          </p:cNvPr>
-          <p:cNvSpPr>
-            <a:spLocks noGrp="1"/>
-          </p:cNvSpPr>
-          <p:nvPr>
-            <p:ph type="title"/>
-          </p:nvPr>
-        </p:nvSpPr>
-        <p:spPr/>
-        <p:txBody>
-          <a:bodyPr/>
-          <a:lstStyle/>
-          <a:p>
-            <a:r>
-              <a:rPr lang="en-US" dirty="0"/>
-              <a:t>Congestion Control - Reno</a:t>
-            </a:r>
-          </a:p>
-        </p:txBody>
-      </p:sp>
-      <p:sp>
-        <p:nvSpPr>
-          <p:cNvPr id="3" name="Text Placeholder 2">
-            <a:extLst>
-              <a:ext uri="{FF2B5EF4-FFF2-40B4-BE49-F238E27FC236}">
-                <a16:creationId xmlns:a16="http://schemas.microsoft.com/office/drawing/2014/main" id="{81AD9B1E-F4E0-E092-662B-C945BAF28377}"/>
-              </a:ext>
-            </a:extLst>
-          </p:cNvPr>
-          <p:cNvSpPr>
-            <a:spLocks noGrp="1"/>
-          </p:cNvSpPr>
-          <p:nvPr>
-            <p:ph type="body" idx="1"/>
-          </p:nvPr>
-        </p:nvSpPr>
-        <p:spPr>
-          <a:xfrm>
-            <a:off x="838200" y="2590800"/>
-            <a:ext cx="10515600" cy="3586163"/>
-          </a:xfrm>
-        </p:spPr>
-        <p:txBody>
-          <a:bodyPr/>
-          <a:lstStyle/>
-          <a:p>
-            <a:r>
-              <a:rPr lang="en-US" dirty="0"/>
-              <a:t>As Implemented</a:t>
-            </a:r>
-          </a:p>
-          <a:p>
-            <a:pPr lvl="1"/>
-            <a:r>
-              <a:rPr lang="en-US" dirty="0"/>
-              <a:t>Window increases by adding a new initial congestion window</a:t>
-            </a:r>
-          </a:p>
-          <a:p>
-            <a:pPr lvl="1"/>
-            <a:r>
-              <a:rPr lang="en-US" dirty="0"/>
-              <a:t>Upon loss, window is halved</a:t>
-            </a:r>
-          </a:p>
-        </p:txBody>
-      </p:sp>
-    </p:spTree>
-    <p:extLst>
-      <p:ext uri="{BB962C8B-B14F-4D97-AF65-F5344CB8AC3E}">
-        <p14:creationId xmlns:p14="http://schemas.microsoft.com/office/powerpoint/2010/main" val="3086890696"/>
-      </p:ext>
-    </p:extLst>
-  </p:cSld>
-  <p:clrMapOvr>
-    <a:masterClrMapping/>
-  </p:clrMapOvr>
-  <p:transition/>
-</p:sld>
-</file>
-
-<file path=ppt/slides/slide15.xml><?xml version="1.0" encoding="utf-8"?>
-<p:sld xmlns:a="http://schemas.openxmlformats.org/drawingml/2006/main" xmlns:r="http://schemas.openxmlformats.org/officeDocument/2006/relationships" xmlns:p="http://schemas.openxmlformats.org/presentationml/2006/main">
-  <p:cSld>
-    <p:spTree>
-      <p:nvGrpSpPr>
         <p:cNvPr id="1" name="">
           <a:extLst>
             <a:ext uri="{FF2B5EF4-FFF2-40B4-BE49-F238E27FC236}">
-              <a16:creationId xmlns:a16="http://schemas.microsoft.com/office/drawing/2014/main" id="{0298FE4B-5ECF-020F-DAB0-5C5A626BEAF9}"/>
+              <a16:creationId xmlns:a16="http://schemas.microsoft.com/office/drawing/2014/main" id="{BB3A7D3B-710B-FBB4-896E-6568A18FA92C}"/>
             </a:ext>
           </a:extLst>
         </p:cNvPr>
@@ -10594,7 +10517,7 @@
           <p:cNvPr id="2" name="Title 1">
             <a:extLst>
               <a:ext uri="{FF2B5EF4-FFF2-40B4-BE49-F238E27FC236}">
-                <a16:creationId xmlns:a16="http://schemas.microsoft.com/office/drawing/2014/main" id="{72647F88-9E8E-ECC1-94D6-0717086C437C}"/>
+                <a16:creationId xmlns:a16="http://schemas.microsoft.com/office/drawing/2014/main" id="{1CC9149C-F601-0BEB-CEE4-BB6FD18FF1E3}"/>
               </a:ext>
             </a:extLst>
           </p:cNvPr>
@@ -10612,7 +10535,7 @@
           <a:p>
             <a:r>
               <a:rPr lang="en-US" dirty="0"/>
-              <a:t>Capture 1</a:t>
+              <a:t>Congestion Control - BBR</a:t>
             </a:r>
           </a:p>
         </p:txBody>
@@ -10622,7 +10545,7 @@
           <p:cNvPr id="3" name="Text Placeholder 2">
             <a:extLst>
               <a:ext uri="{FF2B5EF4-FFF2-40B4-BE49-F238E27FC236}">
-                <a16:creationId xmlns:a16="http://schemas.microsoft.com/office/drawing/2014/main" id="{6AE49423-47CA-F35E-23AC-4BA0D63B2B2B}"/>
+                <a16:creationId xmlns:a16="http://schemas.microsoft.com/office/drawing/2014/main" id="{5A6B7AE0-C2D8-C909-ADEC-BB90CF270043}"/>
               </a:ext>
             </a:extLst>
           </p:cNvPr>
@@ -10635,28 +10558,119 @@
         </p:nvSpPr>
         <p:spPr>
           <a:xfrm>
-            <a:off x="838200" y="3429000"/>
-            <a:ext cx="10515600" cy="766763"/>
+            <a:off x="589547" y="1524000"/>
+            <a:ext cx="5486400" cy="4119563"/>
           </a:xfrm>
         </p:spPr>
         <p:txBody>
           <a:bodyPr/>
           <a:lstStyle/>
           <a:p>
-            <a:pPr marL="50800" indent="0" algn="ctr">
-              <a:buNone/>
-            </a:pPr>
             <a:r>
               <a:rPr lang="en-US" dirty="0"/>
-              <a:t>1_scp_200MB_reno.pcap</a:t>
+              <a:t>Existing algorithms use packet loss to measure congestion, but that isn’t accurate</a:t>
+            </a:r>
+          </a:p>
+          <a:p>
+            <a:pPr lvl="1"/>
+            <a:r>
+              <a:rPr lang="en-US" dirty="0"/>
+              <a:t>Packet loss can happen randomly without congestion</a:t>
+            </a:r>
+          </a:p>
+          <a:p>
+            <a:pPr lvl="1"/>
+            <a:r>
+              <a:rPr lang="en-US" dirty="0"/>
+              <a:t>Congestion-induced packet loss is a lagging metric for congestion</a:t>
             </a:r>
           </a:p>
         </p:txBody>
       </p:sp>
+      <p:sp>
+        <p:nvSpPr>
+          <p:cNvPr id="5" name="TextBox 4">
+            <a:extLst>
+              <a:ext uri="{FF2B5EF4-FFF2-40B4-BE49-F238E27FC236}">
+                <a16:creationId xmlns:a16="http://schemas.microsoft.com/office/drawing/2014/main" id="{DF93ED7F-930F-1987-91D0-87D172810745}"/>
+              </a:ext>
+            </a:extLst>
+          </p:cNvPr>
+          <p:cNvSpPr txBox="1"/>
+          <p:nvPr/>
+        </p:nvSpPr>
+        <p:spPr>
+          <a:xfrm>
+            <a:off x="7620000" y="5867400"/>
+            <a:ext cx="2971800" cy="261610"/>
+          </a:xfrm>
+          <a:prstGeom prst="rect">
+            <a:avLst/>
+          </a:prstGeom>
+          <a:noFill/>
+        </p:spPr>
+        <p:txBody>
+          <a:bodyPr wrap="square">
+            <a:spAutoFit/>
+          </a:bodyPr>
+          <a:lstStyle/>
+          <a:p>
+            <a:r>
+              <a:rPr lang="en-US" sz="1100" dirty="0"/>
+              <a:t>https://</a:t>
+            </a:r>
+            <a:r>
+              <a:rPr lang="en-US" sz="1100" dirty="0" err="1"/>
+              <a:t>dl.acm.org</a:t>
+            </a:r>
+            <a:r>
+              <a:rPr lang="en-US" sz="1100" dirty="0"/>
+              <a:t>/</a:t>
+            </a:r>
+            <a:r>
+              <a:rPr lang="en-US" sz="1100" dirty="0" err="1"/>
+              <a:t>doi</a:t>
+            </a:r>
+            <a:r>
+              <a:rPr lang="en-US" sz="1100" dirty="0"/>
+              <a:t>/pdf/10.1145/3009824</a:t>
+            </a:r>
+          </a:p>
+        </p:txBody>
+      </p:sp>
+      <p:pic>
+        <p:nvPicPr>
+          <p:cNvPr id="6" name="Picture 5">
+            <a:extLst>
+              <a:ext uri="{FF2B5EF4-FFF2-40B4-BE49-F238E27FC236}">
+                <a16:creationId xmlns:a16="http://schemas.microsoft.com/office/drawing/2014/main" id="{9466D94C-3207-5242-C789-A00503B939B4}"/>
+              </a:ext>
+            </a:extLst>
+          </p:cNvPr>
+          <p:cNvPicPr>
+            <a:picLocks noChangeAspect="1"/>
+          </p:cNvPicPr>
+          <p:nvPr/>
+        </p:nvPicPr>
+        <p:blipFill>
+          <a:blip r:embed="rId2"/>
+          <a:srcRect/>
+          <a:stretch/>
+        </p:blipFill>
+        <p:spPr>
+          <a:xfrm>
+            <a:off x="5970324" y="925737"/>
+            <a:ext cx="5603311" cy="4782688"/>
+          </a:xfrm>
+          <a:prstGeom prst="rect">
+            <a:avLst/>
+          </a:prstGeom>
+        </p:spPr>
+      </p:pic>
     </p:spTree>
     <p:extLst>
       <p:ext uri="{BB962C8B-B14F-4D97-AF65-F5344CB8AC3E}">
-        <p14:creationId xmlns:p14="http://schemas.microsoft.com/office/powerpoint/2010/main" val="2560564190"/>
+        <p14:creationId xmlns:p14="http://schemas.microsoft.com/office/powerpoint/2010/main" val="3571039076"/>
       </p:ext>
     </p:extLst>
   </p:cSld>
@@ -10667,7 +10681,7 @@
 </p:sld>
 </file>
 
-<file path=ppt/slides/slide16.xml><?xml version="1.0" encoding="utf-8"?>
+<file path=ppt/slides/slide15.xml><?xml version="1.0" encoding="utf-8"?>
 <p:sld xmlns:a="http://schemas.openxmlformats.org/drawingml/2006/main" xmlns:r="http://schemas.openxmlformats.org/officeDocument/2006/relationships" xmlns:p="http://schemas.openxmlformats.org/presentationml/2006/main">
   <p:cSld>
     <p:spTree>
@@ -10872,7 +10886,7 @@
 </p:sld>
 </file>
 
-<file path=ppt/slides/slide17.xml><?xml version="1.0" encoding="utf-8"?>
+<file path=ppt/slides/slide16.xml><?xml version="1.0" encoding="utf-8"?>
 <p:sld xmlns:a="http://schemas.openxmlformats.org/drawingml/2006/main" xmlns:r="http://schemas.openxmlformats.org/officeDocument/2006/relationships" xmlns:p="http://schemas.openxmlformats.org/presentationml/2006/main">
   <p:cSld>
     <p:spTree>
@@ -10954,7 +10968,7 @@
             </a:pPr>
             <a:r>
               <a:rPr lang="en-US" dirty="0"/>
-              <a:t>2_scp_200MB_bbr.pcap</a:t>
+              <a:t>1_scp_200MB_bbr.pcap</a:t>
             </a:r>
           </a:p>
         </p:txBody>
@@ -10973,7 +10987,7 @@
 </p:sld>
 </file>
 
-<file path=ppt/slides/slide18.xml><?xml version="1.0" encoding="utf-8"?>
+<file path=ppt/slides/slide17.xml><?xml version="1.0" encoding="utf-8"?>
 <p:sld xmlns:a="http://schemas.openxmlformats.org/drawingml/2006/main" xmlns:r="http://schemas.openxmlformats.org/officeDocument/2006/relationships" xmlns:p="http://schemas.openxmlformats.org/presentationml/2006/main">
   <p:cSld>
     <p:spTree>
@@ -11055,7 +11069,7 @@
             </a:pPr>
             <a:r>
               <a:rPr lang="en-US" dirty="0"/>
-              <a:t>3_scp_mystery.pcap</a:t>
+              <a:t>2_scp_mystery.pcap</a:t>
             </a:r>
           </a:p>
         </p:txBody>
@@ -11074,7 +11088,7 @@
 </p:sld>
 </file>
 
-<file path=ppt/slides/slide19.xml><?xml version="1.0" encoding="utf-8"?>
+<file path=ppt/slides/slide18.xml><?xml version="1.0" encoding="utf-8"?>
 <p:sld xmlns:a="http://schemas.openxmlformats.org/drawingml/2006/main" xmlns:r="http://schemas.openxmlformats.org/officeDocument/2006/relationships" xmlns:p="http://schemas.openxmlformats.org/presentationml/2006/main">
   <p:cSld>
     <p:spTree>
@@ -11226,260 +11240,7 @@
 </p:sld>
 </file>
 
-<file path=ppt/slides/slide2.xml><?xml version="1.0" encoding="utf-8"?>
-<p:sld xmlns:a="http://schemas.openxmlformats.org/drawingml/2006/main" xmlns:r="http://schemas.openxmlformats.org/officeDocument/2006/relationships" xmlns:p="http://schemas.openxmlformats.org/presentationml/2006/main">
-  <p:cSld>
-    <p:spTree>
-      <p:nvGrpSpPr>
-        <p:cNvPr id="1" name="Shape 69"/>
-        <p:cNvGrpSpPr/>
-        <p:nvPr/>
-      </p:nvGrpSpPr>
-      <p:grpSpPr>
-        <a:xfrm>
-          <a:off x="0" y="0"/>
-          <a:ext cx="0" cy="0"/>
-          <a:chOff x="0" y="0"/>
-          <a:chExt cx="0" cy="0"/>
-        </a:xfrm>
-      </p:grpSpPr>
-      <p:sp>
-        <p:nvSpPr>
-          <p:cNvPr id="70" name="Google Shape;70;p10"/>
-          <p:cNvSpPr txBox="1">
-            <a:spLocks noGrp="1"/>
-          </p:cNvSpPr>
-          <p:nvPr>
-            <p:ph type="title"/>
-          </p:nvPr>
-        </p:nvSpPr>
-        <p:spPr>
-          <a:xfrm>
-            <a:off x="168500" y="77826"/>
-            <a:ext cx="8162100" cy="495300"/>
-          </a:xfrm>
-          <a:prstGeom prst="rect">
-            <a:avLst/>
-          </a:prstGeom>
-          <a:noFill/>
-          <a:ln>
-            <a:noFill/>
-          </a:ln>
-        </p:spPr>
-        <p:txBody>
-          <a:bodyPr spcFirstLastPara="1" wrap="square" lIns="91425" tIns="45700" rIns="91425" bIns="45700" anchor="ctr" anchorCtr="0">
-            <a:normAutofit/>
-          </a:bodyPr>
-          <a:lstStyle/>
-          <a:p>
-            <a:pPr marL="0" lvl="0" indent="0" algn="l" rtl="0">
-              <a:lnSpc>
-                <a:spcPct val="90000"/>
-              </a:lnSpc>
-              <a:spcBef>
-                <a:spcPct val="0"/>
-              </a:spcBef>
-              <a:spcAft>
-                <a:spcPct val="0"/>
-              </a:spcAft>
-              <a:buClr>
-                <a:srgbClr val="D8D8D8"/>
-              </a:buClr>
-              <a:buSzPts val="2800"/>
-              <a:buFont typeface="Play"/>
-              <a:buNone/>
-            </a:pPr>
-            <a:r>
-              <a:rPr lang="de-DE" dirty="0"/>
-              <a:t>About Me</a:t>
-            </a:r>
-            <a:endParaRPr dirty="0"/>
-          </a:p>
-        </p:txBody>
-      </p:sp>
-      <p:sp>
-        <p:nvSpPr>
-          <p:cNvPr id="72" name="Google Shape;72;p10"/>
-          <p:cNvSpPr txBox="1">
-            <a:spLocks noGrp="1"/>
-          </p:cNvSpPr>
-          <p:nvPr>
-            <p:ph type="body" idx="2"/>
-          </p:nvPr>
-        </p:nvSpPr>
-        <p:spPr>
-          <a:xfrm>
-            <a:off x="533400" y="2133600"/>
-            <a:ext cx="10552129" cy="4043363"/>
-          </a:xfrm>
-          <a:prstGeom prst="rect">
-            <a:avLst/>
-          </a:prstGeom>
-          <a:noFill/>
-          <a:ln>
-            <a:noFill/>
-          </a:ln>
-        </p:spPr>
-        <p:txBody>
-          <a:bodyPr spcFirstLastPara="1" wrap="square" lIns="91425" tIns="45700" rIns="91425" bIns="45700" anchor="t" anchorCtr="0">
-            <a:normAutofit/>
-          </a:bodyPr>
-          <a:lstStyle/>
-          <a:p>
-            <a:pPr marL="228600" lvl="0" indent="-228600" algn="l" rtl="0">
-              <a:lnSpc>
-                <a:spcPct val="90000"/>
-              </a:lnSpc>
-              <a:spcBef>
-                <a:spcPct val="0"/>
-              </a:spcBef>
-              <a:spcAft>
-                <a:spcPct val="0"/>
-              </a:spcAft>
-              <a:buClr>
-                <a:srgbClr val="3A3A3A"/>
-              </a:buClr>
-              <a:buSzPts val="2800"/>
-              <a:buChar char="•"/>
-            </a:pPr>
-            <a:r>
-              <a:rPr lang="en-US" dirty="0"/>
-              <a:t>M.S. in Computer Engineering</a:t>
-            </a:r>
-          </a:p>
-          <a:p>
-            <a:pPr marL="685800" lvl="1" indent="-228600">
-              <a:spcBef>
-                <a:spcPct val="0"/>
-              </a:spcBef>
-              <a:buSzPts val="2800"/>
-            </a:pPr>
-            <a:r>
-              <a:rPr lang="en-US" dirty="0"/>
-              <a:t>Focus on networking, protocol design, and security</a:t>
-            </a:r>
-          </a:p>
-          <a:p>
-            <a:pPr marL="228600" indent="-228600">
-              <a:spcBef>
-                <a:spcPct val="0"/>
-              </a:spcBef>
-            </a:pPr>
-            <a:r>
-              <a:rPr lang="en-US" dirty="0"/>
-              <a:t>Distributed Performance Engineer</a:t>
-            </a:r>
-          </a:p>
-          <a:p>
-            <a:pPr marL="685800" lvl="1" indent="-228600">
-              <a:spcBef>
-                <a:spcPct val="0"/>
-              </a:spcBef>
-            </a:pPr>
-            <a:r>
-              <a:rPr lang="en-US" dirty="0"/>
-              <a:t>Using packets to solve complex performance issues</a:t>
-            </a:r>
-          </a:p>
-          <a:p>
-            <a:pPr marL="685800" lvl="1" indent="-228600">
-              <a:spcBef>
-                <a:spcPct val="0"/>
-              </a:spcBef>
-            </a:pPr>
-            <a:endParaRPr lang="en-US" dirty="0"/>
-          </a:p>
-          <a:p>
-            <a:pPr marL="0" indent="0" algn="ctr">
-              <a:spcBef>
-                <a:spcPct val="0"/>
-              </a:spcBef>
-              <a:buNone/>
-            </a:pPr>
-            <a:r>
-              <a:rPr lang="en-US" dirty="0">
-                <a:hlinkClick r:id="rId3"/>
-              </a:rPr>
-              <a:t>https://www.jeclark.net</a:t>
-            </a:r>
-            <a:endParaRPr lang="en-US" dirty="0"/>
-          </a:p>
-          <a:p>
-            <a:pPr marL="0" indent="0" algn="ctr">
-              <a:spcBef>
-                <a:spcPct val="0"/>
-              </a:spcBef>
-              <a:buNone/>
-            </a:pPr>
-            <a:r>
-              <a:rPr lang="en-US" dirty="0">
-                <a:hlinkClick r:id="rId4"/>
-              </a:rPr>
-              <a:t>https://github.com/je-clark</a:t>
-            </a:r>
-            <a:endParaRPr lang="en-US" dirty="0"/>
-          </a:p>
-          <a:p>
-            <a:pPr marL="0" indent="0" algn="ctr">
-              <a:spcBef>
-                <a:spcPct val="0"/>
-              </a:spcBef>
-              <a:buNone/>
-            </a:pPr>
-            <a:r>
-              <a:rPr lang="en-US" dirty="0">
-                <a:hlinkClick r:id="rId5"/>
-              </a:rPr>
-              <a:t>https://github.com/je-clark/sf24_eu_server</a:t>
-            </a:r>
-            <a:r>
-              <a:rPr lang="en-US">
-                <a:hlinkClick r:id="rId5"/>
-              </a:rPr>
-              <a:t>_optimization</a:t>
-            </a:r>
-            <a:endParaRPr lang="en-US" dirty="0"/>
-          </a:p>
-          <a:p>
-            <a:pPr marL="0" indent="0">
-              <a:spcBef>
-                <a:spcPct val="0"/>
-              </a:spcBef>
-              <a:buNone/>
-            </a:pPr>
-            <a:endParaRPr dirty="0"/>
-          </a:p>
-          <a:p>
-            <a:pPr marL="685800" lvl="1" indent="-76200" algn="l" rtl="0">
-              <a:lnSpc>
-                <a:spcPct val="90000"/>
-              </a:lnSpc>
-              <a:spcBef>
-                <a:spcPts val="500"/>
-              </a:spcBef>
-              <a:spcAft>
-                <a:spcPct val="0"/>
-              </a:spcAft>
-              <a:buClr>
-                <a:srgbClr val="3A3A3A"/>
-              </a:buClr>
-              <a:buSzPts val="2400"/>
-              <a:buNone/>
-            </a:pPr>
-            <a:endParaRPr dirty="0"/>
-          </a:p>
-        </p:txBody>
-      </p:sp>
-    </p:spTree>
-  </p:cSld>
-  <p:clrMapOvr>
-    <a:masterClrMapping/>
-  </p:clrMapOvr>
-  <p:transition/>
-</p:sld>
-</file>
-
-<file path=ppt/slides/slide20.xml><?xml version="1.0" encoding="utf-8"?>
+<file path=ppt/slides/slide19.xml><?xml version="1.0" encoding="utf-8"?>
 <p:sld xmlns:a="http://schemas.openxmlformats.org/drawingml/2006/main" xmlns:r="http://schemas.openxmlformats.org/officeDocument/2006/relationships" xmlns:p="http://schemas.openxmlformats.org/presentationml/2006/main">
   <p:cSld>
     <p:spTree>
@@ -11550,7 +11311,260 @@
 </p:sld>
 </file>
 
-<file path=ppt/slides/slide21.xml><?xml version="1.0" encoding="utf-8"?>
+<file path=ppt/slides/slide2.xml><?xml version="1.0" encoding="utf-8"?>
+<p:sld xmlns:a="http://schemas.openxmlformats.org/drawingml/2006/main" xmlns:r="http://schemas.openxmlformats.org/officeDocument/2006/relationships" xmlns:p="http://schemas.openxmlformats.org/presentationml/2006/main">
+  <p:cSld>
+    <p:spTree>
+      <p:nvGrpSpPr>
+        <p:cNvPr id="1" name="Shape 69"/>
+        <p:cNvGrpSpPr/>
+        <p:nvPr/>
+      </p:nvGrpSpPr>
+      <p:grpSpPr>
+        <a:xfrm>
+          <a:off x="0" y="0"/>
+          <a:ext cx="0" cy="0"/>
+          <a:chOff x="0" y="0"/>
+          <a:chExt cx="0" cy="0"/>
+        </a:xfrm>
+      </p:grpSpPr>
+      <p:sp>
+        <p:nvSpPr>
+          <p:cNvPr id="70" name="Google Shape;70;p10"/>
+          <p:cNvSpPr txBox="1">
+            <a:spLocks noGrp="1"/>
+          </p:cNvSpPr>
+          <p:nvPr>
+            <p:ph type="title"/>
+          </p:nvPr>
+        </p:nvSpPr>
+        <p:spPr>
+          <a:xfrm>
+            <a:off x="168500" y="77826"/>
+            <a:ext cx="8162100" cy="495300"/>
+          </a:xfrm>
+          <a:prstGeom prst="rect">
+            <a:avLst/>
+          </a:prstGeom>
+          <a:noFill/>
+          <a:ln>
+            <a:noFill/>
+          </a:ln>
+        </p:spPr>
+        <p:txBody>
+          <a:bodyPr spcFirstLastPara="1" wrap="square" lIns="91425" tIns="45700" rIns="91425" bIns="45700" anchor="ctr" anchorCtr="0">
+            <a:normAutofit/>
+          </a:bodyPr>
+          <a:lstStyle/>
+          <a:p>
+            <a:pPr marL="0" lvl="0" indent="0" algn="l" rtl="0">
+              <a:lnSpc>
+                <a:spcPct val="90000"/>
+              </a:lnSpc>
+              <a:spcBef>
+                <a:spcPct val="0"/>
+              </a:spcBef>
+              <a:spcAft>
+                <a:spcPct val="0"/>
+              </a:spcAft>
+              <a:buClr>
+                <a:srgbClr val="D8D8D8"/>
+              </a:buClr>
+              <a:buSzPts val="2800"/>
+              <a:buFont typeface="Play"/>
+              <a:buNone/>
+            </a:pPr>
+            <a:r>
+              <a:rPr lang="de-DE" dirty="0"/>
+              <a:t>About Me</a:t>
+            </a:r>
+            <a:endParaRPr dirty="0"/>
+          </a:p>
+        </p:txBody>
+      </p:sp>
+      <p:sp>
+        <p:nvSpPr>
+          <p:cNvPr id="72" name="Google Shape;72;p10"/>
+          <p:cNvSpPr txBox="1">
+            <a:spLocks noGrp="1"/>
+          </p:cNvSpPr>
+          <p:nvPr>
+            <p:ph type="body" idx="2"/>
+          </p:nvPr>
+        </p:nvSpPr>
+        <p:spPr>
+          <a:xfrm>
+            <a:off x="533400" y="2133600"/>
+            <a:ext cx="10552129" cy="4043363"/>
+          </a:xfrm>
+          <a:prstGeom prst="rect">
+            <a:avLst/>
+          </a:prstGeom>
+          <a:noFill/>
+          <a:ln>
+            <a:noFill/>
+          </a:ln>
+        </p:spPr>
+        <p:txBody>
+          <a:bodyPr spcFirstLastPara="1" wrap="square" lIns="91425" tIns="45700" rIns="91425" bIns="45700" anchor="t" anchorCtr="0">
+            <a:normAutofit/>
+          </a:bodyPr>
+          <a:lstStyle/>
+          <a:p>
+            <a:pPr marL="228600" lvl="0" indent="-228600" algn="l" rtl="0">
+              <a:lnSpc>
+                <a:spcPct val="90000"/>
+              </a:lnSpc>
+              <a:spcBef>
+                <a:spcPct val="0"/>
+              </a:spcBef>
+              <a:spcAft>
+                <a:spcPct val="0"/>
+              </a:spcAft>
+              <a:buClr>
+                <a:srgbClr val="3A3A3A"/>
+              </a:buClr>
+              <a:buSzPts val="2800"/>
+              <a:buChar char="•"/>
+            </a:pPr>
+            <a:r>
+              <a:rPr lang="en-US" dirty="0"/>
+              <a:t>M.S. in Computer Engineering</a:t>
+            </a:r>
+          </a:p>
+          <a:p>
+            <a:pPr marL="685800" lvl="1" indent="-228600">
+              <a:spcBef>
+                <a:spcPct val="0"/>
+              </a:spcBef>
+              <a:buSzPts val="2800"/>
+            </a:pPr>
+            <a:r>
+              <a:rPr lang="en-US" dirty="0"/>
+              <a:t>Focus on networking, protocol design, and security</a:t>
+            </a:r>
+          </a:p>
+          <a:p>
+            <a:pPr marL="228600" indent="-228600">
+              <a:spcBef>
+                <a:spcPct val="0"/>
+              </a:spcBef>
+            </a:pPr>
+            <a:r>
+              <a:rPr lang="en-US" dirty="0"/>
+              <a:t>Distributed Performance Engineer</a:t>
+            </a:r>
+          </a:p>
+          <a:p>
+            <a:pPr marL="685800" lvl="1" indent="-228600">
+              <a:spcBef>
+                <a:spcPct val="0"/>
+              </a:spcBef>
+            </a:pPr>
+            <a:r>
+              <a:rPr lang="en-US" dirty="0"/>
+              <a:t>Using packets to solve complex performance issues</a:t>
+            </a:r>
+          </a:p>
+          <a:p>
+            <a:pPr marL="685800" lvl="1" indent="-228600">
+              <a:spcBef>
+                <a:spcPct val="0"/>
+              </a:spcBef>
+            </a:pPr>
+            <a:endParaRPr lang="en-US" dirty="0"/>
+          </a:p>
+          <a:p>
+            <a:pPr marL="0" indent="0" algn="ctr">
+              <a:spcBef>
+                <a:spcPct val="0"/>
+              </a:spcBef>
+              <a:buNone/>
+            </a:pPr>
+            <a:r>
+              <a:rPr lang="en-US" dirty="0">
+                <a:hlinkClick r:id="rId3"/>
+              </a:rPr>
+              <a:t>https://www.jeclark.net</a:t>
+            </a:r>
+            <a:endParaRPr lang="en-US" dirty="0"/>
+          </a:p>
+          <a:p>
+            <a:pPr marL="0" indent="0" algn="ctr">
+              <a:spcBef>
+                <a:spcPct val="0"/>
+              </a:spcBef>
+              <a:buNone/>
+            </a:pPr>
+            <a:r>
+              <a:rPr lang="en-US" dirty="0">
+                <a:hlinkClick r:id="rId4"/>
+              </a:rPr>
+              <a:t>https://github.com/je-clark</a:t>
+            </a:r>
+            <a:endParaRPr lang="en-US" dirty="0"/>
+          </a:p>
+          <a:p>
+            <a:pPr marL="0" indent="0" algn="ctr">
+              <a:spcBef>
+                <a:spcPct val="0"/>
+              </a:spcBef>
+              <a:buNone/>
+            </a:pPr>
+            <a:r>
+              <a:rPr lang="en-US" dirty="0">
+                <a:hlinkClick r:id="rId5"/>
+              </a:rPr>
+              <a:t>https://github.com/je-clark/sf24_eu_server</a:t>
+            </a:r>
+            <a:r>
+              <a:rPr lang="en-US">
+                <a:hlinkClick r:id="rId5"/>
+              </a:rPr>
+              <a:t>_optimization</a:t>
+            </a:r>
+            <a:endParaRPr lang="en-US" dirty="0"/>
+          </a:p>
+          <a:p>
+            <a:pPr marL="0" indent="0">
+              <a:spcBef>
+                <a:spcPct val="0"/>
+              </a:spcBef>
+              <a:buNone/>
+            </a:pPr>
+            <a:endParaRPr dirty="0"/>
+          </a:p>
+          <a:p>
+            <a:pPr marL="685800" lvl="1" indent="-76200" algn="l" rtl="0">
+              <a:lnSpc>
+                <a:spcPct val="90000"/>
+              </a:lnSpc>
+              <a:spcBef>
+                <a:spcPts val="500"/>
+              </a:spcBef>
+              <a:spcAft>
+                <a:spcPct val="0"/>
+              </a:spcAft>
+              <a:buClr>
+                <a:srgbClr val="3A3A3A"/>
+              </a:buClr>
+              <a:buSzPts val="2400"/>
+              <a:buNone/>
+            </a:pPr>
+            <a:endParaRPr dirty="0"/>
+          </a:p>
+        </p:txBody>
+      </p:sp>
+    </p:spTree>
+  </p:cSld>
+  <p:clrMapOvr>
+    <a:masterClrMapping/>
+  </p:clrMapOvr>
+  <p:transition/>
+</p:sld>
+</file>
+
+<file path=ppt/slides/slide20.xml><?xml version="1.0" encoding="utf-8"?>
 <p:sld xmlns:a="http://schemas.openxmlformats.org/drawingml/2006/main" xmlns:r="http://schemas.openxmlformats.org/officeDocument/2006/relationships" xmlns:p="http://schemas.openxmlformats.org/presentationml/2006/main">
   <p:cSld>
     <p:spTree>
@@ -11645,7 +11659,7 @@
 </p:sld>
 </file>
 
-<file path=ppt/slides/slide22.xml><?xml version="1.0" encoding="utf-8"?>
+<file path=ppt/slides/slide21.xml><?xml version="1.0" encoding="utf-8"?>
 <p:sld xmlns:a="http://schemas.openxmlformats.org/drawingml/2006/main" xmlns:r="http://schemas.openxmlformats.org/officeDocument/2006/relationships" xmlns:p="http://schemas.openxmlformats.org/presentationml/2006/main">
   <p:cSld>
     <p:spTree>
@@ -11739,7 +11753,7 @@
 </p:sld>
 </file>
 
-<file path=ppt/slides/slide23.xml><?xml version="1.0" encoding="utf-8"?>
+<file path=ppt/slides/slide22.xml><?xml version="1.0" encoding="utf-8"?>
 <p:sld xmlns:a="http://schemas.openxmlformats.org/drawingml/2006/main" xmlns:r="http://schemas.openxmlformats.org/officeDocument/2006/relationships" xmlns:p="http://schemas.openxmlformats.org/presentationml/2006/main">
   <p:cSld>
     <p:spTree>
@@ -11821,7 +11835,7 @@
             </a:pPr>
             <a:r>
               <a:rPr lang="en-US" dirty="0"/>
-              <a:t>4_small_http_request.pcap</a:t>
+              <a:t>3_small_http_request.pcap</a:t>
             </a:r>
           </a:p>
         </p:txBody>
@@ -11840,7 +11854,7 @@
 </p:sld>
 </file>
 
-<file path=ppt/slides/slide24.xml><?xml version="1.0" encoding="utf-8"?>
+<file path=ppt/slides/slide23.xml><?xml version="1.0" encoding="utf-8"?>
 <p:sld xmlns:a="http://schemas.openxmlformats.org/drawingml/2006/main" xmlns:r="http://schemas.openxmlformats.org/officeDocument/2006/relationships" xmlns:p="http://schemas.openxmlformats.org/presentationml/2006/main">
   <p:cSld>
     <p:spTree>
@@ -11995,7 +12009,7 @@
 </p:sld>
 </file>
 
-<file path=ppt/slides/slide25.xml><?xml version="1.0" encoding="utf-8"?>
+<file path=ppt/slides/slide24.xml><?xml version="1.0" encoding="utf-8"?>
 <p:sld xmlns:a="http://schemas.openxmlformats.org/drawingml/2006/main" xmlns:r="http://schemas.openxmlformats.org/officeDocument/2006/relationships" xmlns:p="http://schemas.openxmlformats.org/presentationml/2006/main">
   <p:cSld>
     <p:spTree>
@@ -12077,7 +12091,7 @@
             </a:pPr>
             <a:r>
               <a:rPr lang="en-US" dirty="0"/>
-              <a:t>5_small_http_request_tls13.pcap</a:t>
+              <a:t>4_small_http_request_tls13.pcap</a:t>
             </a:r>
           </a:p>
         </p:txBody>
@@ -12096,7 +12110,7 @@
 </p:sld>
 </file>
 
-<file path=ppt/slides/slide26.xml><?xml version="1.0" encoding="utf-8"?>
+<file path=ppt/slides/slide25.xml><?xml version="1.0" encoding="utf-8"?>
 <p:sld xmlns:a="http://schemas.openxmlformats.org/drawingml/2006/main" xmlns:r="http://schemas.openxmlformats.org/officeDocument/2006/relationships" xmlns:p="http://schemas.openxmlformats.org/presentationml/2006/main">
   <p:cSld>
     <p:spTree>
@@ -12294,7 +12308,7 @@
 </p:sld>
 </file>
 
-<file path=ppt/slides/slide27.xml><?xml version="1.0" encoding="utf-8"?>
+<file path=ppt/slides/slide26.xml><?xml version="1.0" encoding="utf-8"?>
 <p:sld xmlns:a="http://schemas.openxmlformats.org/drawingml/2006/main" xmlns:r="http://schemas.openxmlformats.org/officeDocument/2006/relationships" xmlns:p="http://schemas.openxmlformats.org/presentationml/2006/main">
   <p:cSld>
     <p:spTree>
@@ -12512,7 +12526,7 @@
 </p:sld>
 </file>
 
-<file path=ppt/slides/slide28.xml><?xml version="1.0" encoding="utf-8"?>
+<file path=ppt/slides/slide27.xml><?xml version="1.0" encoding="utf-8"?>
 <p:sld xmlns:a="http://schemas.openxmlformats.org/drawingml/2006/main" xmlns:r="http://schemas.openxmlformats.org/officeDocument/2006/relationships" xmlns:p="http://schemas.openxmlformats.org/presentationml/2006/main">
   <p:cSld>
     <p:spTree>
@@ -12594,7 +12608,7 @@
             </a:pPr>
             <a:r>
               <a:rPr lang="en-US" dirty="0"/>
-              <a:t>6_small_http_request_increased_initcwnd.pcap</a:t>
+              <a:t>5_small_http_request_initcwnd_45.pcapng</a:t>
             </a:r>
           </a:p>
         </p:txBody>
@@ -12613,7 +12627,7 @@
 </p:sld>
 </file>
 
-<file path=ppt/slides/slide29.xml><?xml version="1.0" encoding="utf-8"?>
+<file path=ppt/slides/slide28.xml><?xml version="1.0" encoding="utf-8"?>
 <p:sld xmlns:a="http://schemas.openxmlformats.org/drawingml/2006/main" xmlns:r="http://schemas.openxmlformats.org/officeDocument/2006/relationships" xmlns:p="http://schemas.openxmlformats.org/presentationml/2006/main">
   <p:cSld>
     <p:spTree>
@@ -12674,6 +12688,116 @@
     <p:extLst>
       <p:ext uri="{BB962C8B-B14F-4D97-AF65-F5344CB8AC3E}">
         <p14:creationId xmlns:p14="http://schemas.microsoft.com/office/powerpoint/2010/main" val="1127941368"/>
+      </p:ext>
+    </p:extLst>
+  </p:cSld>
+  <p:clrMapOvr>
+    <a:masterClrMapping/>
+  </p:clrMapOvr>
+  <p:transition/>
+</p:sld>
+</file>
+
+<file path=ppt/slides/slide29.xml><?xml version="1.0" encoding="utf-8"?>
+<p:sld xmlns:a="http://schemas.openxmlformats.org/drawingml/2006/main" xmlns:r="http://schemas.openxmlformats.org/officeDocument/2006/relationships" xmlns:p="http://schemas.openxmlformats.org/presentationml/2006/main">
+  <p:cSld>
+    <p:spTree>
+      <p:nvGrpSpPr>
+        <p:cNvPr id="1" name="">
+          <a:extLst>
+            <a:ext uri="{FF2B5EF4-FFF2-40B4-BE49-F238E27FC236}">
+              <a16:creationId xmlns:a16="http://schemas.microsoft.com/office/drawing/2014/main" id="{3EB07B53-F5C5-5290-2ABE-812F8317D06A}"/>
+            </a:ext>
+          </a:extLst>
+        </p:cNvPr>
+        <p:cNvGrpSpPr/>
+        <p:nvPr/>
+      </p:nvGrpSpPr>
+      <p:grpSpPr>
+        <a:xfrm>
+          <a:off x="0" y="0"/>
+          <a:ext cx="0" cy="0"/>
+          <a:chOff x="0" y="0"/>
+          <a:chExt cx="0" cy="0"/>
+        </a:xfrm>
+      </p:grpSpPr>
+      <p:sp>
+        <p:nvSpPr>
+          <p:cNvPr id="2" name="Title 1">
+            <a:extLst>
+              <a:ext uri="{FF2B5EF4-FFF2-40B4-BE49-F238E27FC236}">
+                <a16:creationId xmlns:a16="http://schemas.microsoft.com/office/drawing/2014/main" id="{97EA3997-6226-2811-C4B0-4A54FEC12403}"/>
+              </a:ext>
+            </a:extLst>
+          </p:cNvPr>
+          <p:cNvSpPr>
+            <a:spLocks noGrp="1"/>
+          </p:cNvSpPr>
+          <p:nvPr>
+            <p:ph type="title"/>
+          </p:nvPr>
+        </p:nvSpPr>
+        <p:spPr/>
+        <p:txBody>
+          <a:bodyPr/>
+          <a:lstStyle/>
+          <a:p>
+            <a:r>
+              <a:rPr lang="en-US" dirty="0"/>
+              <a:t>Congestion Control - Reno</a:t>
+            </a:r>
+          </a:p>
+        </p:txBody>
+      </p:sp>
+      <p:sp>
+        <p:nvSpPr>
+          <p:cNvPr id="3" name="Text Placeholder 2">
+            <a:extLst>
+              <a:ext uri="{FF2B5EF4-FFF2-40B4-BE49-F238E27FC236}">
+                <a16:creationId xmlns:a16="http://schemas.microsoft.com/office/drawing/2014/main" id="{BD41D0A6-3FF4-559E-AE21-665C001A77D4}"/>
+              </a:ext>
+            </a:extLst>
+          </p:cNvPr>
+          <p:cNvSpPr>
+            <a:spLocks noGrp="1"/>
+          </p:cNvSpPr>
+          <p:nvPr>
+            <p:ph type="body" idx="1"/>
+          </p:nvPr>
+        </p:nvSpPr>
+        <p:spPr>
+          <a:xfrm>
+            <a:off x="838200" y="2590800"/>
+            <a:ext cx="10515600" cy="3586163"/>
+          </a:xfrm>
+        </p:spPr>
+        <p:txBody>
+          <a:bodyPr/>
+          <a:lstStyle/>
+          <a:p>
+            <a:r>
+              <a:rPr lang="en-US" dirty="0"/>
+              <a:t>Increased CPU utilization</a:t>
+            </a:r>
+          </a:p>
+          <a:p>
+            <a:r>
+              <a:rPr lang="en-US" dirty="0"/>
+              <a:t>Increased memory utilization</a:t>
+            </a:r>
+          </a:p>
+          <a:p>
+            <a:r>
+              <a:rPr lang="en-US" dirty="0"/>
+              <a:t>TCP Zero Windows</a:t>
+            </a:r>
+          </a:p>
+        </p:txBody>
+      </p:sp>
+    </p:spTree>
+    <p:extLst>
+      <p:ext uri="{BB962C8B-B14F-4D97-AF65-F5344CB8AC3E}">
+        <p14:creationId xmlns:p14="http://schemas.microsoft.com/office/powerpoint/2010/main" val="220868644"/>
       </p:ext>
     </p:extLst>
   </p:cSld>
@@ -13523,116 +13647,6 @@
         <p:cNvPr id="1" name="">
           <a:extLst>
             <a:ext uri="{FF2B5EF4-FFF2-40B4-BE49-F238E27FC236}">
-              <a16:creationId xmlns:a16="http://schemas.microsoft.com/office/drawing/2014/main" id="{3EB07B53-F5C5-5290-2ABE-812F8317D06A}"/>
-            </a:ext>
-          </a:extLst>
-        </p:cNvPr>
-        <p:cNvGrpSpPr/>
-        <p:nvPr/>
-      </p:nvGrpSpPr>
-      <p:grpSpPr>
-        <a:xfrm>
-          <a:off x="0" y="0"/>
-          <a:ext cx="0" cy="0"/>
-          <a:chOff x="0" y="0"/>
-          <a:chExt cx="0" cy="0"/>
-        </a:xfrm>
-      </p:grpSpPr>
-      <p:sp>
-        <p:nvSpPr>
-          <p:cNvPr id="2" name="Title 1">
-            <a:extLst>
-              <a:ext uri="{FF2B5EF4-FFF2-40B4-BE49-F238E27FC236}">
-                <a16:creationId xmlns:a16="http://schemas.microsoft.com/office/drawing/2014/main" id="{97EA3997-6226-2811-C4B0-4A54FEC12403}"/>
-              </a:ext>
-            </a:extLst>
-          </p:cNvPr>
-          <p:cNvSpPr>
-            <a:spLocks noGrp="1"/>
-          </p:cNvSpPr>
-          <p:nvPr>
-            <p:ph type="title"/>
-          </p:nvPr>
-        </p:nvSpPr>
-        <p:spPr/>
-        <p:txBody>
-          <a:bodyPr/>
-          <a:lstStyle/>
-          <a:p>
-            <a:r>
-              <a:rPr lang="en-US" dirty="0"/>
-              <a:t>Congestion Control - Reno</a:t>
-            </a:r>
-          </a:p>
-        </p:txBody>
-      </p:sp>
-      <p:sp>
-        <p:nvSpPr>
-          <p:cNvPr id="3" name="Text Placeholder 2">
-            <a:extLst>
-              <a:ext uri="{FF2B5EF4-FFF2-40B4-BE49-F238E27FC236}">
-                <a16:creationId xmlns:a16="http://schemas.microsoft.com/office/drawing/2014/main" id="{BD41D0A6-3FF4-559E-AE21-665C001A77D4}"/>
-              </a:ext>
-            </a:extLst>
-          </p:cNvPr>
-          <p:cNvSpPr>
-            <a:spLocks noGrp="1"/>
-          </p:cNvSpPr>
-          <p:nvPr>
-            <p:ph type="body" idx="1"/>
-          </p:nvPr>
-        </p:nvSpPr>
-        <p:spPr>
-          <a:xfrm>
-            <a:off x="838200" y="2590800"/>
-            <a:ext cx="10515600" cy="3586163"/>
-          </a:xfrm>
-        </p:spPr>
-        <p:txBody>
-          <a:bodyPr/>
-          <a:lstStyle/>
-          <a:p>
-            <a:r>
-              <a:rPr lang="en-US" dirty="0"/>
-              <a:t>Increased CPU utilization</a:t>
-            </a:r>
-          </a:p>
-          <a:p>
-            <a:r>
-              <a:rPr lang="en-US" dirty="0"/>
-              <a:t>Increased memory utilization</a:t>
-            </a:r>
-          </a:p>
-          <a:p>
-            <a:r>
-              <a:rPr lang="en-US" dirty="0"/>
-              <a:t>TCP Zero Windows</a:t>
-            </a:r>
-          </a:p>
-        </p:txBody>
-      </p:sp>
-    </p:spTree>
-    <p:extLst>
-      <p:ext uri="{BB962C8B-B14F-4D97-AF65-F5344CB8AC3E}">
-        <p14:creationId xmlns:p14="http://schemas.microsoft.com/office/powerpoint/2010/main" val="220868644"/>
-      </p:ext>
-    </p:extLst>
-  </p:cSld>
-  <p:clrMapOvr>
-    <a:masterClrMapping/>
-  </p:clrMapOvr>
-  <p:transition/>
-</p:sld>
-</file>
-
-<file path=ppt/slides/slide31.xml><?xml version="1.0" encoding="utf-8"?>
-<p:sld xmlns:a="http://schemas.openxmlformats.org/drawingml/2006/main" xmlns:r="http://schemas.openxmlformats.org/officeDocument/2006/relationships" xmlns:p="http://schemas.openxmlformats.org/presentationml/2006/main">
-  <p:cSld>
-    <p:spTree>
-      <p:nvGrpSpPr>
-        <p:cNvPr id="1" name="">
-          <a:extLst>
-            <a:ext uri="{FF2B5EF4-FFF2-40B4-BE49-F238E27FC236}">
               <a16:creationId xmlns:a16="http://schemas.microsoft.com/office/drawing/2014/main" id="{17B8AFD3-9610-B6F6-3ED7-493C7D34629E}"/>
             </a:ext>
           </a:extLst>
@@ -13696,7 +13710,7 @@
 </p:sld>
 </file>
 
-<file path=ppt/slides/slide32.xml><?xml version="1.0" encoding="utf-8"?>
+<file path=ppt/slides/slide31.xml><?xml version="1.0" encoding="utf-8"?>
 <p:sld xmlns:a="http://schemas.openxmlformats.org/drawingml/2006/main" xmlns:r="http://schemas.openxmlformats.org/officeDocument/2006/relationships" xmlns:p="http://schemas.openxmlformats.org/presentationml/2006/main">
   <p:cSld>
     <p:spTree>

</xml_diff>

<commit_message>
updated deck and created PDF export
</commit_message>
<xml_diff>
--- a/PacketGuidedOptimization_Sharkfest2024_EU_JClark.pptx
+++ b/PacketGuidedOptimization_Sharkfest2024_EU_JClark.pptx
@@ -5,7 +5,7 @@
     <p:sldMasterId id="2147483655" r:id="rId1"/>
   </p:sldMasterIdLst>
   <p:notesMasterIdLst>
-    <p:notesMasterId r:id="rId33"/>
+    <p:notesMasterId r:id="rId32"/>
   </p:notesMasterIdLst>
   <p:sldIdLst>
     <p:sldId id="256" r:id="rId2"/>
@@ -37,13 +37,12 @@
     <p:sldId id="285" r:id="rId28"/>
     <p:sldId id="286" r:id="rId29"/>
     <p:sldId id="287" r:id="rId30"/>
-    <p:sldId id="288" r:id="rId31"/>
-    <p:sldId id="259" r:id="rId32"/>
+    <p:sldId id="259" r:id="rId31"/>
   </p:sldIdLst>
   <p:sldSz cx="12192000" cy="6858000"/>
   <p:notesSz cx="6858000" cy="9144000"/>
   <p:custDataLst>
-    <p:tags r:id="rId34"/>
+    <p:tags r:id="rId33"/>
   </p:custDataLst>
   <p:defaultTextStyle>
     <a:defPPr marR="0" lvl="0" algn="l" rtl="0">
@@ -298,7 +297,7 @@
   <pc:docChgLst>
     <pc:chgData name="Josh Clark" userId="038a1c1f14b3b0b8" providerId="LiveId" clId="{F8908E4E-5DCD-EC49-8621-19D828DF10B4}"/>
     <pc:docChg chg="undo custSel addSld delSld modSld sldOrd">
-      <pc:chgData name="Josh Clark" userId="038a1c1f14b3b0b8" providerId="LiveId" clId="{F8908E4E-5DCD-EC49-8621-19D828DF10B4}" dt="2024-10-29T04:12:26.136" v="1781" actId="20577"/>
+      <pc:chgData name="Josh Clark" userId="038a1c1f14b3b0b8" providerId="LiveId" clId="{F8908E4E-5DCD-EC49-8621-19D828DF10B4}" dt="2024-11-06T13:16:42.354" v="1782" actId="2696"/>
       <pc:docMkLst>
         <pc:docMk/>
       </pc:docMkLst>
@@ -1193,8 +1192,8 @@
           </ac:spMkLst>
         </pc:spChg>
       </pc:sldChg>
-      <pc:sldChg chg="modSp add mod ord">
-        <pc:chgData name="Josh Clark" userId="038a1c1f14b3b0b8" providerId="LiveId" clId="{F8908E4E-5DCD-EC49-8621-19D828DF10B4}" dt="2024-10-12T16:43:09.734" v="1265" actId="20577"/>
+      <pc:sldChg chg="modSp add del mod ord">
+        <pc:chgData name="Josh Clark" userId="038a1c1f14b3b0b8" providerId="LiveId" clId="{F8908E4E-5DCD-EC49-8621-19D828DF10B4}" dt="2024-11-06T13:16:42.354" v="1782" actId="2696"/>
         <pc:sldMkLst>
           <pc:docMk/>
           <pc:sldMk cId="3799079537" sldId="288"/>
@@ -2826,7 +2825,7 @@
             </a:pPr>
             <a:fld id="{00000000-1234-1234-1234-123412341234}" type="slidenum">
               <a:rPr lang="de-DE"/>
-              <a:t>31</a:t>
+              <a:t>30</a:t>
             </a:fld>
             <a:endParaRPr/>
           </a:p>
@@ -13648,77 +13647,6 @@
 </file>
 
 <file path=ppt/slides/slide30.xml><?xml version="1.0" encoding="utf-8"?>
-<p:sld xmlns:a="http://schemas.openxmlformats.org/drawingml/2006/main" xmlns:r="http://schemas.openxmlformats.org/officeDocument/2006/relationships" xmlns:p="http://schemas.openxmlformats.org/presentationml/2006/main">
-  <p:cSld>
-    <p:spTree>
-      <p:nvGrpSpPr>
-        <p:cNvPr id="1" name="">
-          <a:extLst>
-            <a:ext uri="{FF2B5EF4-FFF2-40B4-BE49-F238E27FC236}">
-              <a16:creationId xmlns:a16="http://schemas.microsoft.com/office/drawing/2014/main" id="{17B8AFD3-9610-B6F6-3ED7-493C7D34629E}"/>
-            </a:ext>
-          </a:extLst>
-        </p:cNvPr>
-        <p:cNvGrpSpPr/>
-        <p:nvPr/>
-      </p:nvGrpSpPr>
-      <p:grpSpPr>
-        <a:xfrm>
-          <a:off x="0" y="0"/>
-          <a:ext cx="0" cy="0"/>
-          <a:chOff x="0" y="0"/>
-          <a:chExt cx="0" cy="0"/>
-        </a:xfrm>
-      </p:grpSpPr>
-      <p:sp>
-        <p:nvSpPr>
-          <p:cNvPr id="2" name="Title 1">
-            <a:extLst>
-              <a:ext uri="{FF2B5EF4-FFF2-40B4-BE49-F238E27FC236}">
-                <a16:creationId xmlns:a16="http://schemas.microsoft.com/office/drawing/2014/main" id="{CB9F141E-2BD8-F5FD-A41D-FAC2B3047E5E}"/>
-              </a:ext>
-            </a:extLst>
-          </p:cNvPr>
-          <p:cNvSpPr>
-            <a:spLocks noGrp="1"/>
-          </p:cNvSpPr>
-          <p:nvPr>
-            <p:ph type="title"/>
-          </p:nvPr>
-        </p:nvSpPr>
-        <p:spPr>
-          <a:xfrm>
-            <a:off x="831850" y="1603377"/>
-            <a:ext cx="10515600" cy="2587624"/>
-          </a:xfrm>
-        </p:spPr>
-        <p:txBody>
-          <a:bodyPr/>
-          <a:lstStyle/>
-          <a:p>
-            <a:pPr algn="ctr"/>
-            <a:r>
-              <a:rPr lang="en-US" dirty="0"/>
-              <a:t>Conclusion</a:t>
-            </a:r>
-          </a:p>
-        </p:txBody>
-      </p:sp>
-    </p:spTree>
-    <p:extLst>
-      <p:ext uri="{BB962C8B-B14F-4D97-AF65-F5344CB8AC3E}">
-        <p14:creationId xmlns:p14="http://schemas.microsoft.com/office/powerpoint/2010/main" val="3799079537"/>
-      </p:ext>
-    </p:extLst>
-  </p:cSld>
-  <p:clrMapOvr>
-    <a:masterClrMapping/>
-  </p:clrMapOvr>
-  <p:transition/>
-</p:sld>
-</file>
-
-<file path=ppt/slides/slide31.xml><?xml version="1.0" encoding="utf-8"?>
 <p:sld xmlns:a="http://schemas.openxmlformats.org/drawingml/2006/main" xmlns:r="http://schemas.openxmlformats.org/officeDocument/2006/relationships" xmlns:p="http://schemas.openxmlformats.org/presentationml/2006/main">
   <p:cSld>
     <p:spTree>

</xml_diff>